<commit_message>
Material de clase a
</commit_message>
<xml_diff>
--- a/Diapositiva.pptx
+++ b/Diapositiva.pptx
@@ -9434,7 +9434,7 @@
         </p:blipFill>
         <p:spPr bwMode="auto">
           <a:xfrm>
-            <a:off x="8513090" y="671073"/>
+            <a:off x="8513090" y="855460"/>
             <a:ext cx="2324100" cy="1524000"/>
           </a:xfrm>
           <a:prstGeom prst="rect">
@@ -11080,67 +11080,67 @@
           </a:lstStyle>
           <a:p>
             <a:r>
-              <a:rPr lang="es-CO" dirty="0"/>
+              <a:rPr lang="es-CO" strike="sngStrike" dirty="0"/>
               <a:t>Tipos de datos</a:t>
             </a:r>
           </a:p>
           <a:p>
             <a:r>
-              <a:rPr lang="es-CO" dirty="0"/>
+              <a:rPr lang="es-CO" strike="sngStrike" dirty="0"/>
               <a:t>Operadores aritméticos</a:t>
             </a:r>
           </a:p>
           <a:p>
             <a:r>
-              <a:rPr lang="es-CO" dirty="0"/>
+              <a:rPr lang="es-CO" strike="sngStrike" dirty="0"/>
               <a:t>Operadores lógicos</a:t>
             </a:r>
           </a:p>
           <a:p>
             <a:r>
-              <a:rPr lang="es-CO" dirty="0"/>
+              <a:rPr lang="es-CO" strike="sngStrike" dirty="0"/>
               <a:t>Operadores de asignación</a:t>
             </a:r>
           </a:p>
           <a:p>
             <a:r>
-              <a:rPr lang="es-CO" dirty="0"/>
+              <a:rPr lang="es-CO" strike="sngStrike" dirty="0"/>
               <a:t>Estructuras condicionales</a:t>
             </a:r>
           </a:p>
           <a:p>
             <a:r>
-              <a:rPr lang="es-CO" dirty="0"/>
+              <a:rPr lang="es-CO" strike="sngStrike" dirty="0"/>
               <a:t>Listas</a:t>
             </a:r>
           </a:p>
           <a:p>
             <a:r>
-              <a:rPr lang="es-CO" dirty="0"/>
+              <a:rPr lang="es-CO" strike="sngStrike" dirty="0"/>
               <a:t>Tupla</a:t>
             </a:r>
           </a:p>
           <a:p>
             <a:r>
-              <a:rPr lang="es-CO" dirty="0"/>
+              <a:rPr lang="es-CO" strike="sngStrike" dirty="0"/>
               <a:t>Diccionario</a:t>
             </a:r>
           </a:p>
           <a:p>
             <a:r>
-              <a:rPr lang="es-CO" dirty="0"/>
+              <a:rPr lang="es-CO" strike="sngStrike" dirty="0"/>
               <a:t>Estructuras de repetición</a:t>
             </a:r>
           </a:p>
           <a:p>
             <a:r>
-              <a:rPr lang="es-CO" dirty="0"/>
+              <a:rPr lang="es-CO" strike="sngStrike" dirty="0"/>
               <a:t>Excepciones</a:t>
             </a:r>
           </a:p>
           <a:p>
             <a:r>
-              <a:rPr lang="es-CO" dirty="0"/>
+              <a:rPr lang="es-CO" strike="sngStrike" dirty="0"/>
               <a:t>POO</a:t>
             </a:r>
           </a:p>

</xml_diff>